<commit_message>
On branch master  Your branch is up to date with 'origin/master'.
 Changes to be committed:
	modified:   .DS_Store
	new file:   docs/20190621_DeCarvalhoLabRDMreview.jpg
	new file:   docs/GroundRules.docx
	new file:   docs/MeetingAgenda_20190621.docx
	modified:   docs/Presentation_template.pptx
	new file:   docs/Timeline.docx

Updated with minutes and documents from first meeting.
</commit_message>
<xml_diff>
--- a/docs/Presentation_template.pptx
+++ b/docs/Presentation_template.pptx
@@ -160,12 +160,41 @@
 </p:presentation>
 </file>
 
-<file path=ppt/revisionInfo.xml><?xml version="1.0" encoding="utf-8"?>
-<p1510:revInfo xmlns:a="http://schemas.openxmlformats.org/drawingml/2006/main" xmlns:r="http://schemas.openxmlformats.org/officeDocument/2006/relationships" xmlns:p1510="http://schemas.microsoft.com/office/powerpoint/2015/10/main">
-  <p1510:revLst>
-    <p1510:client id="{ADD1502A-EE5A-9941-91DD-9C6223369541}" v="49" dt="2019-06-02T18:44:21.130"/>
-  </p1510:revLst>
-</p1510:revInfo>
+<file path=ppt/changesInfos/changesInfo1.xml><?xml version="1.0" encoding="utf-8"?>
+<pc:chgInfo xmlns:a="http://schemas.openxmlformats.org/drawingml/2006/main" xmlns:r="http://schemas.openxmlformats.org/officeDocument/2006/relationships" xmlns:ac="http://schemas.microsoft.com/office/drawing/2013/main/command" xmlns:pc="http://schemas.microsoft.com/office/powerpoint/2013/main/command">
+  <pc:docChgLst>
+    <pc:chgData name="Bell, Emma" userId="604bf8ae-27c2-4d4d-a82b-f9254ed3bf26" providerId="ADAL" clId="{4D734C3A-A060-D545-857E-C2A823FB5538}"/>
+    <pc:docChg chg="custSel modSld">
+      <pc:chgData name="Bell, Emma" userId="604bf8ae-27c2-4d4d-a82b-f9254ed3bf26" providerId="ADAL" clId="{4D734C3A-A060-D545-857E-C2A823FB5538}" dt="2019-06-17T20:02:26.728" v="48" actId="20577"/>
+      <pc:docMkLst>
+        <pc:docMk/>
+      </pc:docMkLst>
+      <pc:sldChg chg="modSp">
+        <pc:chgData name="Bell, Emma" userId="604bf8ae-27c2-4d4d-a82b-f9254ed3bf26" providerId="ADAL" clId="{4D734C3A-A060-D545-857E-C2A823FB5538}" dt="2019-06-17T20:02:26.728" v="48" actId="20577"/>
+        <pc:sldMkLst>
+          <pc:docMk/>
+          <pc:sldMk cId="97927404" sldId="256"/>
+        </pc:sldMkLst>
+        <pc:spChg chg="mod">
+          <ac:chgData name="Bell, Emma" userId="604bf8ae-27c2-4d4d-a82b-f9254ed3bf26" providerId="ADAL" clId="{4D734C3A-A060-D545-857E-C2A823FB5538}" dt="2019-06-17T20:02:18.017" v="38" actId="27636"/>
+          <ac:spMkLst>
+            <pc:docMk/>
+            <pc:sldMk cId="97927404" sldId="256"/>
+            <ac:spMk id="2" creationId="{982B24C3-257E-7346-82A5-F096930209AE}"/>
+          </ac:spMkLst>
+        </pc:spChg>
+        <pc:spChg chg="mod">
+          <ac:chgData name="Bell, Emma" userId="604bf8ae-27c2-4d4d-a82b-f9254ed3bf26" providerId="ADAL" clId="{4D734C3A-A060-D545-857E-C2A823FB5538}" dt="2019-06-17T20:02:26.728" v="48" actId="20577"/>
+          <ac:spMkLst>
+            <pc:docMk/>
+            <pc:sldMk cId="97927404" sldId="256"/>
+            <ac:spMk id="3" creationId="{0E9C7B25-64B0-A140-A0E4-D246FC041E0D}"/>
+          </ac:spMkLst>
+        </pc:spChg>
+      </pc:sldChg>
+    </pc:docChg>
+  </pc:docChgLst>
+</pc:chgInfo>
 </file>
 
 <file path=ppt/notesMasters/notesMaster1.xml><?xml version="1.0" encoding="utf-8"?>
@@ -250,7 +279,7 @@
           <a:p>
             <a:fld id="{60C973AE-4BF1-E44A-BA01-3BBB7E758EB7}" type="datetimeFigureOut">
               <a:rPr lang="en-US" smtClean="0"/>
-              <a:t>6/2/19</a:t>
+              <a:t>6/17/19</a:t>
             </a:fld>
             <a:endParaRPr lang="en-US"/>
           </a:p>
@@ -1204,7 +1233,7 @@
           <a:p>
             <a:fld id="{88AC2A37-C366-204B-BEC9-67A1DF2E8BC6}" type="datetimeFigureOut">
               <a:rPr lang="en-US" smtClean="0"/>
-              <a:t>6/2/19</a:t>
+              <a:t>6/17/19</a:t>
             </a:fld>
             <a:endParaRPr lang="en-US"/>
           </a:p>
@@ -11105,7 +11134,7 @@
           <a:p>
             <a:fld id="{F8411435-0C09-2646-9F4F-0AC3F7D3A974}" type="datetimeFigureOut">
               <a:rPr lang="en-US" smtClean="0"/>
-              <a:t>6/2/19</a:t>
+              <a:t>6/17/19</a:t>
             </a:fld>
             <a:endParaRPr lang="en-US"/>
           </a:p>
@@ -11303,7 +11332,7 @@
           <a:p>
             <a:fld id="{F8411435-0C09-2646-9F4F-0AC3F7D3A974}" type="datetimeFigureOut">
               <a:rPr lang="en-US" smtClean="0"/>
-              <a:t>6/2/19</a:t>
+              <a:t>6/17/19</a:t>
             </a:fld>
             <a:endParaRPr lang="en-US"/>
           </a:p>
@@ -11578,7 +11607,7 @@
           <a:p>
             <a:fld id="{F8411435-0C09-2646-9F4F-0AC3F7D3A974}" type="datetimeFigureOut">
               <a:rPr lang="en-US" smtClean="0"/>
-              <a:t>6/2/19</a:t>
+              <a:t>6/17/19</a:t>
             </a:fld>
             <a:endParaRPr lang="en-US"/>
           </a:p>
@@ -11843,7 +11872,7 @@
           <a:p>
             <a:fld id="{F8411435-0C09-2646-9F4F-0AC3F7D3A974}" type="datetimeFigureOut">
               <a:rPr lang="en-US" smtClean="0"/>
-              <a:t>6/2/19</a:t>
+              <a:t>6/17/19</a:t>
             </a:fld>
             <a:endParaRPr lang="en-US"/>
           </a:p>
@@ -12255,7 +12284,7 @@
           <a:p>
             <a:fld id="{F8411435-0C09-2646-9F4F-0AC3F7D3A974}" type="datetimeFigureOut">
               <a:rPr lang="en-US" smtClean="0"/>
-              <a:t>6/2/19</a:t>
+              <a:t>6/17/19</a:t>
             </a:fld>
             <a:endParaRPr lang="en-US"/>
           </a:p>
@@ -12396,7 +12425,7 @@
           <a:p>
             <a:fld id="{F8411435-0C09-2646-9F4F-0AC3F7D3A974}" type="datetimeFigureOut">
               <a:rPr lang="en-US" smtClean="0"/>
-              <a:t>6/2/19</a:t>
+              <a:t>6/17/19</a:t>
             </a:fld>
             <a:endParaRPr lang="en-US"/>
           </a:p>
@@ -12509,7 +12538,7 @@
           <a:p>
             <a:fld id="{F8411435-0C09-2646-9F4F-0AC3F7D3A974}" type="datetimeFigureOut">
               <a:rPr lang="en-US" smtClean="0"/>
-              <a:t>6/2/19</a:t>
+              <a:t>6/17/19</a:t>
             </a:fld>
             <a:endParaRPr lang="en-US"/>
           </a:p>
@@ -12820,7 +12849,7 @@
           <a:p>
             <a:fld id="{F8411435-0C09-2646-9F4F-0AC3F7D3A974}" type="datetimeFigureOut">
               <a:rPr lang="en-US" smtClean="0"/>
-              <a:t>6/2/19</a:t>
+              <a:t>6/17/19</a:t>
             </a:fld>
             <a:endParaRPr lang="en-US"/>
           </a:p>
@@ -13108,7 +13137,7 @@
           <a:p>
             <a:fld id="{F8411435-0C09-2646-9F4F-0AC3F7D3A974}" type="datetimeFigureOut">
               <a:rPr lang="en-US" smtClean="0"/>
-              <a:t>6/2/19</a:t>
+              <a:t>6/17/19</a:t>
             </a:fld>
             <a:endParaRPr lang="en-US"/>
           </a:p>
@@ -13306,7 +13335,7 @@
           <a:p>
             <a:fld id="{F8411435-0C09-2646-9F4F-0AC3F7D3A974}" type="datetimeFigureOut">
               <a:rPr lang="en-US" smtClean="0"/>
-              <a:t>6/2/19</a:t>
+              <a:t>6/17/19</a:t>
             </a:fld>
             <a:endParaRPr lang="en-US"/>
           </a:p>
@@ -13724,7 +13753,7 @@
           <a:p>
             <a:fld id="{F8411435-0C09-2646-9F4F-0AC3F7D3A974}" type="datetimeFigureOut">
               <a:rPr lang="en-US" smtClean="0"/>
-              <a:t>6/2/19</a:t>
+              <a:t>6/17/19</a:t>
             </a:fld>
             <a:endParaRPr lang="en-US"/>
           </a:p>
@@ -18206,7 +18235,7 @@
           <a:p>
             <a:fld id="{F8411435-0C09-2646-9F4F-0AC3F7D3A974}" type="datetimeFigureOut">
               <a:rPr lang="en-US" smtClean="0"/>
-              <a:t>6/2/19</a:t>
+              <a:t>6/17/19</a:t>
             </a:fld>
             <a:endParaRPr lang="en-US"/>
           </a:p>
@@ -18718,7 +18747,7 @@
         </p:spPr>
         <p:txBody>
           <a:bodyPr anchor="b">
-            <a:normAutofit/>
+            <a:normAutofit fontScale="90000"/>
           </a:bodyPr>
           <a:lstStyle/>
           <a:p>
@@ -18731,7 +18760,7 @@
                 <a:latin typeface="+mn-lt"/>
                 <a:ea typeface="+mj-ea"/>
               </a:rPr>
-              <a:t>TITLE</a:t>
+              <a:t>Research Data Management Working Group</a:t>
             </a:r>
           </a:p>
         </p:txBody>
@@ -18771,34 +18800,7 @@
                   <a:srgbClr val="FFFFFF"/>
                 </a:solidFill>
               </a:rPr>
-              <a:t>Emma Bell, PhD</a:t>
-            </a:r>
-          </a:p>
-          <a:p>
-            <a:pPr algn="r"/>
-            <a:r>
-              <a:rPr lang="en-US" sz="1800" dirty="0" err="1">
-                <a:solidFill>
-                  <a:srgbClr val="FFFFFF"/>
-                </a:solidFill>
-              </a:rPr>
-              <a:t>emma.bell@uhnresearch.ca</a:t>
-            </a:r>
-            <a:endParaRPr lang="en-US" sz="1800" dirty="0">
-              <a:solidFill>
-                <a:srgbClr val="FFFFFF"/>
-              </a:solidFill>
-            </a:endParaRPr>
-          </a:p>
-          <a:p>
-            <a:pPr algn="r"/>
-            <a:r>
-              <a:rPr lang="en-US" sz="1800" dirty="0">
-                <a:solidFill>
-                  <a:srgbClr val="FFFFFF"/>
-                </a:solidFill>
-              </a:rPr>
-              <a:t>@emmabell42</a:t>
+              <a:t>2019-06-21</a:t>
             </a:r>
           </a:p>
         </p:txBody>
@@ -21619,7 +21621,7 @@
         <a:effectLst/>
         <a:extLst>
           <a:ext uri="{AF507438-7753-43e0-B8FC-AC1667EBCBE1}">
-            <a14:hiddenEffects xmlns:a14="http://schemas.microsoft.com/office/drawing/2010/main" xmlns="">
+            <a14:hiddenEffects xmlns="" xmlns:a14="http://schemas.microsoft.com/office/drawing/2010/main">
               <a:effectLst>
                 <a:outerShdw blurRad="63500" dist="38099" dir="2700000" algn="ctr" rotWithShape="0">
                   <a:schemeClr val="bg2">
@@ -21695,7 +21697,7 @@
         <a:effectLst/>
         <a:extLst>
           <a:ext uri="{AF507438-7753-43e0-B8FC-AC1667EBCBE1}">
-            <a14:hiddenEffects xmlns:a14="http://schemas.microsoft.com/office/drawing/2010/main" xmlns="">
+            <a14:hiddenEffects xmlns="" xmlns:a14="http://schemas.microsoft.com/office/drawing/2010/main">
               <a:effectLst>
                 <a:outerShdw blurRad="63500" dist="38099" dir="2700000" algn="ctr" rotWithShape="0">
                   <a:schemeClr val="bg2">
@@ -22286,7 +22288,7 @@
         <a:effectLst/>
         <a:extLst>
           <a:ext uri="{AF507438-7753-43e0-B8FC-AC1667EBCBE1}">
-            <a14:hiddenEffects xmlns:a14="http://schemas.microsoft.com/office/drawing/2010/main" xmlns="">
+            <a14:hiddenEffects xmlns="" xmlns:a14="http://schemas.microsoft.com/office/drawing/2010/main">
               <a:effectLst>
                 <a:outerShdw blurRad="63500" dist="38099" dir="2700000" algn="ctr" rotWithShape="0">
                   <a:schemeClr val="bg2">
@@ -22362,7 +22364,7 @@
         <a:effectLst/>
         <a:extLst>
           <a:ext uri="{AF507438-7753-43e0-B8FC-AC1667EBCBE1}">
-            <a14:hiddenEffects xmlns:a14="http://schemas.microsoft.com/office/drawing/2010/main" xmlns="">
+            <a14:hiddenEffects xmlns="" xmlns:a14="http://schemas.microsoft.com/office/drawing/2010/main">
               <a:effectLst>
                 <a:outerShdw blurRad="63500" dist="38099" dir="2700000" algn="ctr" rotWithShape="0">
                   <a:schemeClr val="bg2">
@@ -23153,7 +23155,7 @@
         <a:effectLst/>
         <a:extLst>
           <a:ext uri="{AF507438-7753-43e0-B8FC-AC1667EBCBE1}">
-            <a14:hiddenEffects xmlns:a14="http://schemas.microsoft.com/office/drawing/2010/main" xmlns="">
+            <a14:hiddenEffects xmlns="" xmlns:a14="http://schemas.microsoft.com/office/drawing/2010/main">
               <a:effectLst>
                 <a:outerShdw blurRad="63500" dist="38099" dir="2700000" algn="ctr" rotWithShape="0">
                   <a:schemeClr val="bg2">
@@ -23229,7 +23231,7 @@
         <a:effectLst/>
         <a:extLst>
           <a:ext uri="{AF507438-7753-43e0-B8FC-AC1667EBCBE1}">
-            <a14:hiddenEffects xmlns:a14="http://schemas.microsoft.com/office/drawing/2010/main" xmlns="">
+            <a14:hiddenEffects xmlns="" xmlns:a14="http://schemas.microsoft.com/office/drawing/2010/main">
               <a:effectLst>
                 <a:outerShdw blurRad="63500" dist="38099" dir="2700000" algn="ctr" rotWithShape="0">
                   <a:schemeClr val="bg2">
@@ -23820,7 +23822,7 @@
         <a:effectLst/>
         <a:extLst>
           <a:ext uri="{AF507438-7753-43e0-B8FC-AC1667EBCBE1}">
-            <a14:hiddenEffects xmlns:a14="http://schemas.microsoft.com/office/drawing/2010/main" xmlns="">
+            <a14:hiddenEffects xmlns="" xmlns:a14="http://schemas.microsoft.com/office/drawing/2010/main">
               <a:effectLst>
                 <a:outerShdw blurRad="63500" dist="38099" dir="2700000" algn="ctr" rotWithShape="0">
                   <a:schemeClr val="bg2">
@@ -23896,7 +23898,7 @@
         <a:effectLst/>
         <a:extLst>
           <a:ext uri="{AF507438-7753-43e0-B8FC-AC1667EBCBE1}">
-            <a14:hiddenEffects xmlns:a14="http://schemas.microsoft.com/office/drawing/2010/main" xmlns="">
+            <a14:hiddenEffects xmlns="" xmlns:a14="http://schemas.microsoft.com/office/drawing/2010/main">
               <a:effectLst>
                 <a:outerShdw blurRad="63500" dist="38099" dir="2700000" algn="ctr" rotWithShape="0">
                   <a:schemeClr val="bg2">
@@ -24687,7 +24689,7 @@
         <a:effectLst/>
         <a:extLst>
           <a:ext uri="{AF507438-7753-43e0-B8FC-AC1667EBCBE1}">
-            <a14:hiddenEffects xmlns:a14="http://schemas.microsoft.com/office/drawing/2010/main" xmlns="">
+            <a14:hiddenEffects xmlns="" xmlns:a14="http://schemas.microsoft.com/office/drawing/2010/main">
               <a:effectLst>
                 <a:outerShdw blurRad="63500" dist="38099" dir="2700000" algn="ctr" rotWithShape="0">
                   <a:schemeClr val="bg2">
@@ -24763,7 +24765,7 @@
         <a:effectLst/>
         <a:extLst>
           <a:ext uri="{AF507438-7753-43e0-B8FC-AC1667EBCBE1}">
-            <a14:hiddenEffects xmlns:a14="http://schemas.microsoft.com/office/drawing/2010/main" xmlns="">
+            <a14:hiddenEffects xmlns="" xmlns:a14="http://schemas.microsoft.com/office/drawing/2010/main">
               <a:effectLst>
                 <a:outerShdw blurRad="63500" dist="38099" dir="2700000" algn="ctr" rotWithShape="0">
                   <a:schemeClr val="bg2">
@@ -25354,7 +25356,7 @@
         <a:effectLst/>
         <a:extLst>
           <a:ext uri="{AF507438-7753-43e0-B8FC-AC1667EBCBE1}">
-            <a14:hiddenEffects xmlns:a14="http://schemas.microsoft.com/office/drawing/2010/main" xmlns="">
+            <a14:hiddenEffects xmlns="" xmlns:a14="http://schemas.microsoft.com/office/drawing/2010/main">
               <a:effectLst>
                 <a:outerShdw blurRad="63500" dist="38099" dir="2700000" algn="ctr" rotWithShape="0">
                   <a:schemeClr val="bg2">
@@ -25430,7 +25432,7 @@
         <a:effectLst/>
         <a:extLst>
           <a:ext uri="{AF507438-7753-43e0-B8FC-AC1667EBCBE1}">
-            <a14:hiddenEffects xmlns:a14="http://schemas.microsoft.com/office/drawing/2010/main" xmlns="">
+            <a14:hiddenEffects xmlns="" xmlns:a14="http://schemas.microsoft.com/office/drawing/2010/main">
               <a:effectLst>
                 <a:outerShdw blurRad="63500" dist="38099" dir="2700000" algn="ctr" rotWithShape="0">
                   <a:schemeClr val="bg2">

</xml_diff>